<commit_message>
Update docs on Model changes
</commit_message>
<xml_diff>
--- a/docs/diagrams/SceneClassDiagram.pptx
+++ b/docs/diagrams/SceneClassDiagram.pptx
@@ -197,7 +197,7 @@
           <a:p>
             <a:fld id="{18F4DF89-2F77-42CB-B0C6-F63BD038D8C1}" type="datetimeFigureOut">
               <a:rPr lang="en-SG" smtClean="0"/>
-              <a:t>1/4/2020</a:t>
+              <a:t>8/4/2020</a:t>
             </a:fld>
             <a:endParaRPr lang="en-SG"/>
           </a:p>
@@ -698,7 +698,7 @@
           <a:p>
             <a:fld id="{A1DDB25B-591A-4807-BF87-81D6EC4FFA73}" type="datetimeFigureOut">
               <a:rPr lang="en-SG" smtClean="0"/>
-              <a:t>1/4/2020</a:t>
+              <a:t>8/4/2020</a:t>
             </a:fld>
             <a:endParaRPr lang="en-SG"/>
           </a:p>
@@ -898,7 +898,7 @@
           <a:p>
             <a:fld id="{A1DDB25B-591A-4807-BF87-81D6EC4FFA73}" type="datetimeFigureOut">
               <a:rPr lang="en-SG" smtClean="0"/>
-              <a:t>1/4/2020</a:t>
+              <a:t>8/4/2020</a:t>
             </a:fld>
             <a:endParaRPr lang="en-SG"/>
           </a:p>
@@ -1108,7 +1108,7 @@
           <a:p>
             <a:fld id="{A1DDB25B-591A-4807-BF87-81D6EC4FFA73}" type="datetimeFigureOut">
               <a:rPr lang="en-SG" smtClean="0"/>
-              <a:t>1/4/2020</a:t>
+              <a:t>8/4/2020</a:t>
             </a:fld>
             <a:endParaRPr lang="en-SG"/>
           </a:p>
@@ -1308,7 +1308,7 @@
           <a:p>
             <a:fld id="{A1DDB25B-591A-4807-BF87-81D6EC4FFA73}" type="datetimeFigureOut">
               <a:rPr lang="en-SG" smtClean="0"/>
-              <a:t>1/4/2020</a:t>
+              <a:t>8/4/2020</a:t>
             </a:fld>
             <a:endParaRPr lang="en-SG"/>
           </a:p>
@@ -1584,7 +1584,7 @@
           <a:p>
             <a:fld id="{A1DDB25B-591A-4807-BF87-81D6EC4FFA73}" type="datetimeFigureOut">
               <a:rPr lang="en-SG" smtClean="0"/>
-              <a:t>1/4/2020</a:t>
+              <a:t>8/4/2020</a:t>
             </a:fld>
             <a:endParaRPr lang="en-SG"/>
           </a:p>
@@ -1852,7 +1852,7 @@
           <a:p>
             <a:fld id="{A1DDB25B-591A-4807-BF87-81D6EC4FFA73}" type="datetimeFigureOut">
               <a:rPr lang="en-SG" smtClean="0"/>
-              <a:t>1/4/2020</a:t>
+              <a:t>8/4/2020</a:t>
             </a:fld>
             <a:endParaRPr lang="en-SG"/>
           </a:p>
@@ -2267,7 +2267,7 @@
           <a:p>
             <a:fld id="{A1DDB25B-591A-4807-BF87-81D6EC4FFA73}" type="datetimeFigureOut">
               <a:rPr lang="en-SG" smtClean="0"/>
-              <a:t>1/4/2020</a:t>
+              <a:t>8/4/2020</a:t>
             </a:fld>
             <a:endParaRPr lang="en-SG"/>
           </a:p>
@@ -2409,7 +2409,7 @@
           <a:p>
             <a:fld id="{A1DDB25B-591A-4807-BF87-81D6EC4FFA73}" type="datetimeFigureOut">
               <a:rPr lang="en-SG" smtClean="0"/>
-              <a:t>1/4/2020</a:t>
+              <a:t>8/4/2020</a:t>
             </a:fld>
             <a:endParaRPr lang="en-SG"/>
           </a:p>
@@ -2522,7 +2522,7 @@
           <a:p>
             <a:fld id="{A1DDB25B-591A-4807-BF87-81D6EC4FFA73}" type="datetimeFigureOut">
               <a:rPr lang="en-SG" smtClean="0"/>
-              <a:t>1/4/2020</a:t>
+              <a:t>8/4/2020</a:t>
             </a:fld>
             <a:endParaRPr lang="en-SG"/>
           </a:p>
@@ -2835,7 +2835,7 @@
           <a:p>
             <a:fld id="{A1DDB25B-591A-4807-BF87-81D6EC4FFA73}" type="datetimeFigureOut">
               <a:rPr lang="en-SG" smtClean="0"/>
-              <a:t>1/4/2020</a:t>
+              <a:t>8/4/2020</a:t>
             </a:fld>
             <a:endParaRPr lang="en-SG"/>
           </a:p>
@@ -3124,7 +3124,7 @@
           <a:p>
             <a:fld id="{A1DDB25B-591A-4807-BF87-81D6EC4FFA73}" type="datetimeFigureOut">
               <a:rPr lang="en-SG" smtClean="0"/>
-              <a:t>1/4/2020</a:t>
+              <a:t>8/4/2020</a:t>
             </a:fld>
             <a:endParaRPr lang="en-SG"/>
           </a:p>
@@ -3367,7 +3367,7 @@
           <a:p>
             <a:fld id="{A1DDB25B-591A-4807-BF87-81D6EC4FFA73}" type="datetimeFigureOut">
               <a:rPr lang="en-SG" smtClean="0"/>
-              <a:t>1/4/2020</a:t>
+              <a:t>8/4/2020</a:t>
             </a:fld>
             <a:endParaRPr lang="en-SG"/>
           </a:p>
@@ -3798,8 +3798,8 @@
         </p:nvSpPr>
         <p:spPr>
           <a:xfrm>
-            <a:off x="6036687" y="4144484"/>
-            <a:ext cx="4111714" cy="2370333"/>
+            <a:off x="6587154" y="4144484"/>
+            <a:ext cx="3414094" cy="1636362"/>
           </a:xfrm>
           <a:prstGeom prst="roundRect">
             <a:avLst>
@@ -3864,8 +3864,8 @@
         </p:nvSpPr>
         <p:spPr>
           <a:xfrm>
-            <a:off x="1441071" y="4143081"/>
-            <a:ext cx="4328252" cy="2371129"/>
+            <a:off x="1857375" y="4143081"/>
+            <a:ext cx="3708507" cy="2371129"/>
           </a:xfrm>
           <a:prstGeom prst="roundRect">
             <a:avLst>
@@ -4063,7 +4063,7 @@
         </p:nvSpPr>
         <p:spPr>
           <a:xfrm>
-            <a:off x="3090167" y="4011027"/>
+            <a:off x="3126369" y="4611960"/>
             <a:ext cx="278163" cy="369332"/>
           </a:xfrm>
           <a:prstGeom prst="rect">
@@ -4519,8 +4519,8 @@
         </p:nvCxnSpPr>
         <p:spPr>
           <a:xfrm rot="16200000" flipH="1">
-            <a:off x="6689299" y="2924301"/>
-            <a:ext cx="593683" cy="2223810"/>
+            <a:off x="6713155" y="2900444"/>
+            <a:ext cx="540468" cy="2218309"/>
           </a:xfrm>
           <a:prstGeom prst="bentConnector3">
             <a:avLst>
@@ -4612,7 +4612,7 @@
         </p:nvSpPr>
         <p:spPr>
           <a:xfrm>
-            <a:off x="7135207" y="4333048"/>
+            <a:off x="7129706" y="4279833"/>
             <a:ext cx="1925675" cy="384992"/>
           </a:xfrm>
           <a:prstGeom prst="roundRect">
@@ -4650,12 +4650,12 @@
           <a:p>
             <a:pPr algn="ctr"/>
             <a:r>
-              <a:rPr lang="en-US" dirty="0">
+              <a:rPr lang="en-US" dirty="0" err="1">
                 <a:solidFill>
                   <a:schemeClr val="tx1"/>
                 </a:solidFill>
               </a:rPr>
-              <a:t>Entity</a:t>
+              <a:t>ModelManager</a:t>
             </a:r>
             <a:endParaRPr lang="en-SG" dirty="0">
               <a:solidFill>
@@ -4677,14 +4677,14 @@
           <p:cNvCxnSpPr>
             <a:cxnSpLocks/>
             <a:stCxn id="62" idx="2"/>
-            <a:endCxn id="79" idx="0"/>
+            <a:endCxn id="37" idx="0"/>
           </p:cNvCxnSpPr>
           <p:nvPr/>
         </p:nvCxnSpPr>
         <p:spPr>
           <a:xfrm rot="5400000">
-            <a:off x="4371292" y="2818694"/>
-            <a:ext cx="582273" cy="2423615"/>
+            <a:off x="4399166" y="2789376"/>
+            <a:ext cx="525080" cy="2425058"/>
           </a:xfrm>
           <a:prstGeom prst="bentConnector3">
             <a:avLst>
@@ -4724,7 +4724,7 @@
         </p:nvSpPr>
         <p:spPr>
           <a:xfrm>
-            <a:off x="8223780" y="4011027"/>
+            <a:off x="8121416" y="3785014"/>
             <a:ext cx="278163" cy="369332"/>
           </a:xfrm>
           <a:prstGeom prst="rect">
@@ -4740,7 +4740,7 @@
           <a:p>
             <a:r>
               <a:rPr lang="en-US" dirty="0"/>
-              <a:t>*</a:t>
+              <a:t>1</a:t>
             </a:r>
             <a:endParaRPr lang="en-SG" dirty="0"/>
           </a:p>
@@ -5248,7 +5248,7 @@
         </p:nvCxnSpPr>
         <p:spPr>
           <a:xfrm flipV="1">
-            <a:off x="4413457" y="4380359"/>
+            <a:off x="4412015" y="5052381"/>
             <a:ext cx="12700" cy="125945"/>
           </a:xfrm>
           <a:prstGeom prst="bentConnector4">
@@ -5290,7 +5290,7 @@
         </p:nvSpPr>
         <p:spPr>
           <a:xfrm>
-            <a:off x="4455849" y="4116863"/>
+            <a:off x="4454407" y="4788885"/>
             <a:ext cx="278163" cy="369332"/>
           </a:xfrm>
           <a:prstGeom prst="rect">
@@ -5326,8 +5326,8 @@
         </p:nvSpPr>
         <p:spPr>
           <a:xfrm>
-            <a:off x="4568882" y="4301529"/>
-            <a:ext cx="1525472" cy="369332"/>
+            <a:off x="4567440" y="4973551"/>
+            <a:ext cx="1050859" cy="369332"/>
           </a:xfrm>
           <a:prstGeom prst="rect">
             <a:avLst/>
@@ -5362,7 +5362,7 @@
         </p:nvSpPr>
         <p:spPr>
           <a:xfrm>
-            <a:off x="2487781" y="4680679"/>
+            <a:off x="2486339" y="5352701"/>
             <a:ext cx="1925675" cy="1004897"/>
           </a:xfrm>
           <a:prstGeom prst="roundRect">
@@ -5456,7 +5456,7 @@
         </p:nvSpPr>
         <p:spPr>
           <a:xfrm>
-            <a:off x="2487782" y="4321638"/>
+            <a:off x="2486340" y="4993660"/>
             <a:ext cx="1925675" cy="369332"/>
           </a:xfrm>
           <a:prstGeom prst="roundRect">
@@ -5500,6 +5500,251 @@
                 </a:solidFill>
               </a:rPr>
               <a:t>Widget</a:t>
+            </a:r>
+            <a:endParaRPr lang="en-SG" dirty="0">
+              <a:solidFill>
+                <a:schemeClr val="tx1"/>
+              </a:solidFill>
+            </a:endParaRPr>
+          </a:p>
+        </p:txBody>
+      </p:sp>
+      <p:sp>
+        <p:nvSpPr>
+          <p:cNvPr id="37" name="Rectangle: Rounded Corners 36">
+            <a:extLst>
+              <a:ext uri="{FF2B5EF4-FFF2-40B4-BE49-F238E27FC236}">
+                <a16:creationId xmlns:a16="http://schemas.microsoft.com/office/drawing/2014/main" id="{F5BCE990-F4F4-47C9-9963-2CD016A019FC}"/>
+              </a:ext>
+            </a:extLst>
+          </p:cNvPr>
+          <p:cNvSpPr/>
+          <p:nvPr/>
+        </p:nvSpPr>
+        <p:spPr>
+          <a:xfrm>
+            <a:off x="2486339" y="4264445"/>
+            <a:ext cx="1925675" cy="369332"/>
+          </a:xfrm>
+          <a:prstGeom prst="roundRect">
+            <a:avLst>
+              <a:gd name="adj" fmla="val 5708"/>
+            </a:avLst>
+          </a:prstGeom>
+          <a:solidFill>
+            <a:schemeClr val="accent5">
+              <a:lumMod val="40000"/>
+              <a:lumOff val="60000"/>
+            </a:schemeClr>
+          </a:solidFill>
+          <a:ln/>
+        </p:spPr>
+        <p:style>
+          <a:lnRef idx="2">
+            <a:schemeClr val="accent5">
+              <a:shade val="50000"/>
+            </a:schemeClr>
+          </a:lnRef>
+          <a:fillRef idx="1">
+            <a:schemeClr val="accent5"/>
+          </a:fillRef>
+          <a:effectRef idx="0">
+            <a:schemeClr val="accent5"/>
+          </a:effectRef>
+          <a:fontRef idx="minor">
+            <a:schemeClr val="lt1"/>
+          </a:fontRef>
+        </p:style>
+        <p:txBody>
+          <a:bodyPr rtlCol="0" anchor="t" anchorCtr="0"/>
+          <a:lstStyle/>
+          <a:p>
+            <a:pPr algn="ctr"/>
+            <a:r>
+              <a:rPr lang="en-US" dirty="0" err="1">
+                <a:solidFill>
+                  <a:schemeClr val="tx1"/>
+                </a:solidFill>
+              </a:rPr>
+              <a:t>WidgetManager</a:t>
+            </a:r>
+            <a:endParaRPr lang="en-SG" dirty="0">
+              <a:solidFill>
+                <a:schemeClr val="tx1"/>
+              </a:solidFill>
+            </a:endParaRPr>
+          </a:p>
+        </p:txBody>
+      </p:sp>
+      <p:cxnSp>
+        <p:nvCxnSpPr>
+          <p:cNvPr id="41" name="Connector: Elbow 40">
+            <a:extLst>
+              <a:ext uri="{FF2B5EF4-FFF2-40B4-BE49-F238E27FC236}">
+                <a16:creationId xmlns:a16="http://schemas.microsoft.com/office/drawing/2014/main" id="{320E7680-DB8B-4E7F-8636-D9E5A3F47663}"/>
+              </a:ext>
+            </a:extLst>
+          </p:cNvPr>
+          <p:cNvCxnSpPr>
+            <a:cxnSpLocks/>
+            <a:stCxn id="37" idx="2"/>
+            <a:endCxn id="79" idx="0"/>
+          </p:cNvCxnSpPr>
+          <p:nvPr/>
+        </p:nvCxnSpPr>
+        <p:spPr>
+          <a:xfrm rot="16200000" flipH="1">
+            <a:off x="3269236" y="4813717"/>
+            <a:ext cx="359883" cy="1"/>
+          </a:xfrm>
+          <a:prstGeom prst="bentConnector3">
+            <a:avLst>
+              <a:gd name="adj1" fmla="val 50000"/>
+            </a:avLst>
+          </a:prstGeom>
+          <a:ln w="12700">
+            <a:tailEnd type="arrow" w="lg" len="lg"/>
+          </a:ln>
+        </p:spPr>
+        <p:style>
+          <a:lnRef idx="1">
+            <a:schemeClr val="dk1"/>
+          </a:lnRef>
+          <a:fillRef idx="0">
+            <a:schemeClr val="dk1"/>
+          </a:fillRef>
+          <a:effectRef idx="0">
+            <a:schemeClr val="dk1"/>
+          </a:effectRef>
+          <a:fontRef idx="minor">
+            <a:schemeClr val="tx1"/>
+          </a:fontRef>
+        </p:style>
+      </p:cxnSp>
+      <p:sp>
+        <p:nvSpPr>
+          <p:cNvPr id="45" name="TextBox 44">
+            <a:extLst>
+              <a:ext uri="{FF2B5EF4-FFF2-40B4-BE49-F238E27FC236}">
+                <a16:creationId xmlns:a16="http://schemas.microsoft.com/office/drawing/2014/main" id="{DC055F87-2B7D-4A50-A4C3-F47E641F40BB}"/>
+              </a:ext>
+            </a:extLst>
+          </p:cNvPr>
+          <p:cNvSpPr txBox="1"/>
+          <p:nvPr/>
+        </p:nvSpPr>
+        <p:spPr>
+          <a:xfrm>
+            <a:off x="3167410" y="3722679"/>
+            <a:ext cx="374355" cy="369332"/>
+          </a:xfrm>
+          <a:prstGeom prst="rect">
+            <a:avLst/>
+          </a:prstGeom>
+          <a:noFill/>
+        </p:spPr>
+        <p:txBody>
+          <a:bodyPr wrap="square" rtlCol="0">
+            <a:spAutoFit/>
+          </a:bodyPr>
+          <a:lstStyle/>
+          <a:p>
+            <a:r>
+              <a:rPr lang="en-US" dirty="0"/>
+              <a:t>1</a:t>
+            </a:r>
+            <a:endParaRPr lang="en-SG" dirty="0"/>
+          </a:p>
+        </p:txBody>
+      </p:sp>
+      <p:sp>
+        <p:nvSpPr>
+          <p:cNvPr id="48" name="Rectangle: Rounded Corners 47">
+            <a:extLst>
+              <a:ext uri="{FF2B5EF4-FFF2-40B4-BE49-F238E27FC236}">
+                <a16:creationId xmlns:a16="http://schemas.microsoft.com/office/drawing/2014/main" id="{F2760073-7CFD-42F1-B9FF-E72EA2A40E37}"/>
+              </a:ext>
+            </a:extLst>
+          </p:cNvPr>
+          <p:cNvSpPr/>
+          <p:nvPr/>
+        </p:nvSpPr>
+        <p:spPr>
+          <a:xfrm>
+            <a:off x="7129705" y="4660201"/>
+            <a:ext cx="1925675" cy="1011937"/>
+          </a:xfrm>
+          <a:prstGeom prst="roundRect">
+            <a:avLst>
+              <a:gd name="adj" fmla="val 5708"/>
+            </a:avLst>
+          </a:prstGeom>
+          <a:solidFill>
+            <a:schemeClr val="accent3">
+              <a:lumMod val="60000"/>
+              <a:lumOff val="40000"/>
+            </a:schemeClr>
+          </a:solidFill>
+          <a:ln w="12700"/>
+        </p:spPr>
+        <p:style>
+          <a:lnRef idx="2">
+            <a:schemeClr val="accent3">
+              <a:shade val="50000"/>
+            </a:schemeClr>
+          </a:lnRef>
+          <a:fillRef idx="1">
+            <a:schemeClr val="accent3"/>
+          </a:fillRef>
+          <a:effectRef idx="0">
+            <a:schemeClr val="accent3"/>
+          </a:effectRef>
+          <a:fontRef idx="minor">
+            <a:schemeClr val="lt1"/>
+          </a:fontRef>
+        </p:style>
+        <p:txBody>
+          <a:bodyPr rtlCol="0" anchor="t" anchorCtr="0"/>
+          <a:lstStyle/>
+          <a:p>
+            <a:pPr algn="ctr"/>
+            <a:r>
+              <a:rPr lang="en-US" dirty="0">
+                <a:solidFill>
+                  <a:schemeClr val="tx1"/>
+                </a:solidFill>
+              </a:rPr>
+              <a:t>Camera</a:t>
+            </a:r>
+          </a:p>
+          <a:p>
+            <a:pPr algn="ctr"/>
+            <a:r>
+              <a:rPr lang="en-US" dirty="0" err="1">
+                <a:solidFill>
+                  <a:schemeClr val="tx1"/>
+                </a:solidFill>
+              </a:rPr>
+              <a:t>doTick</a:t>
+            </a:r>
+            <a:r>
+              <a:rPr lang="en-US" dirty="0">
+                <a:solidFill>
+                  <a:schemeClr val="tx1"/>
+                </a:solidFill>
+              </a:rPr>
+              <a:t>()</a:t>
+            </a:r>
+          </a:p>
+          <a:p>
+            <a:pPr algn="ctr"/>
+            <a:r>
+              <a:rPr lang="en-US" dirty="0">
+                <a:solidFill>
+                  <a:schemeClr val="tx1"/>
+                </a:solidFill>
+              </a:rPr>
+              <a:t>draw()</a:t>
             </a:r>
             <a:endParaRPr lang="en-SG" dirty="0">
               <a:solidFill>

</xml_diff>